<commit_message>
Typo corrections and minor enhancements
</commit_message>
<xml_diff>
--- a/Slides-RPR/2019-H1-DAA-L18-Applns-D_n_C.pptx
+++ b/Slides-RPR/2019-H1-DAA-L18-Applns-D_n_C.pptx
@@ -3045,13 +3045,61 @@
           <a:p>
             <a:pPr/>
             <a:r>
-              <a:t>Q10 (Levitin): </a:t>
+              <a:t>Q</a:t>
+            </a:r>
+            <a:r>
+              <a:rPr>
+                <a:latin typeface="Arial"/>
+                <a:ea typeface="Arial"/>
+                <a:cs typeface="Arial"/>
+                <a:sym typeface="Arial"/>
+              </a:rPr>
+              <a:t>10</a:t>
+            </a:r>
+            <a:r>
+              <a:t> (Levitin): </a:t>
             </a:r>
           </a:p>
           <a:p>
             <a:pPr lvl="1"/>
             <a:r>
-              <a:t>A celebrity among a group of N people is a person who knows nobody but is known to everybody else. Identify the celebrity by only asking the questions to the people of the form:  “Do you know him/her?” Design an efficient algorithm to identify a celebrity or determine that the group has no such person. How many questions does your algorithm need in the worst case?</a:t>
+              <a:t>A celebrity among a group of N people is defined as</a:t>
+            </a:r>
+          </a:p>
+          <a:p>
+            <a:pPr lvl="2"/>
+            <a:r>
+              <a:t>a person who knows nobody but </a:t>
+            </a:r>
+          </a:p>
+          <a:p>
+            <a:pPr lvl="2"/>
+            <a:r>
+              <a:t>is known to everybody else. </a:t>
+            </a:r>
+          </a:p>
+          <a:p>
+            <a:pPr lvl="1"/>
+            <a:r>
+              <a:t>Identify the celebrity by only asking the questions to the people of the form:  </a:t>
+            </a:r>
+          </a:p>
+          <a:p>
+            <a:pPr lvl="2"/>
+            <a:r>
+              <a:t>“Do you know him/her?” </a:t>
+            </a:r>
+          </a:p>
+          <a:p>
+            <a:pPr lvl="1"/>
+            <a:r>
+              <a:t>Design an efficient algorithm to identify a celebrity or determine that the group has no such person. </a:t>
+            </a:r>
+          </a:p>
+          <a:p>
+            <a:pPr lvl="1"/>
+            <a:r>
+              <a:t>How many questions does your algorithm need to ask in the worst case?</a:t>
             </a:r>
           </a:p>
         </p:txBody>
@@ -3301,6 +3349,294 @@
                       </p:childTnLst>
                     </p:cTn>
                   </p:par>
+                  <p:par>
+                    <p:cTn id="13" fill="hold">
+                      <p:stCondLst>
+                        <p:cond delay="indefinite"/>
+                      </p:stCondLst>
+                      <p:childTnLst>
+                        <p:par>
+                          <p:cTn id="14" fill="hold">
+                            <p:stCondLst>
+                              <p:cond delay="0"/>
+                            </p:stCondLst>
+                            <p:childTnLst>
+                              <p:par>
+                                <p:cTn id="15" presetClass="entr" nodeType="clickEffect" presetSubtype="0" presetID="1" grpId="1" fill="hold">
+                                  <p:stCondLst>
+                                    <p:cond delay="0"/>
+                                  </p:stCondLst>
+                                  <p:iterate type="el" backwards="0">
+                                    <p:tmAbs val="0"/>
+                                  </p:iterate>
+                                  <p:childTnLst>
+                                    <p:set>
+                                      <p:cBhvr>
+                                        <p:cTn id="16" fill="hold"/>
+                                        <p:tgtEl>
+                                          <p:spTgt spid="54">
+                                            <p:txEl>
+                                              <p:pRg st="2" end="2"/>
+                                            </p:txEl>
+                                          </p:spTgt>
+                                        </p:tgtEl>
+                                        <p:attrNameLst>
+                                          <p:attrName>style.visibility</p:attrName>
+                                        </p:attrNameLst>
+                                      </p:cBhvr>
+                                      <p:to>
+                                        <p:strVal val="visible"/>
+                                      </p:to>
+                                    </p:set>
+                                  </p:childTnLst>
+                                </p:cTn>
+                              </p:par>
+                            </p:childTnLst>
+                          </p:cTn>
+                        </p:par>
+                      </p:childTnLst>
+                    </p:cTn>
+                  </p:par>
+                  <p:par>
+                    <p:cTn id="17" fill="hold">
+                      <p:stCondLst>
+                        <p:cond delay="indefinite"/>
+                      </p:stCondLst>
+                      <p:childTnLst>
+                        <p:par>
+                          <p:cTn id="18" fill="hold">
+                            <p:stCondLst>
+                              <p:cond delay="0"/>
+                            </p:stCondLst>
+                            <p:childTnLst>
+                              <p:par>
+                                <p:cTn id="19" presetClass="entr" nodeType="clickEffect" presetSubtype="0" presetID="1" grpId="1" fill="hold">
+                                  <p:stCondLst>
+                                    <p:cond delay="0"/>
+                                  </p:stCondLst>
+                                  <p:iterate type="el" backwards="0">
+                                    <p:tmAbs val="0"/>
+                                  </p:iterate>
+                                  <p:childTnLst>
+                                    <p:set>
+                                      <p:cBhvr>
+                                        <p:cTn id="20" fill="hold"/>
+                                        <p:tgtEl>
+                                          <p:spTgt spid="54">
+                                            <p:txEl>
+                                              <p:pRg st="3" end="3"/>
+                                            </p:txEl>
+                                          </p:spTgt>
+                                        </p:tgtEl>
+                                        <p:attrNameLst>
+                                          <p:attrName>style.visibility</p:attrName>
+                                        </p:attrNameLst>
+                                      </p:cBhvr>
+                                      <p:to>
+                                        <p:strVal val="visible"/>
+                                      </p:to>
+                                    </p:set>
+                                  </p:childTnLst>
+                                </p:cTn>
+                              </p:par>
+                            </p:childTnLst>
+                          </p:cTn>
+                        </p:par>
+                      </p:childTnLst>
+                    </p:cTn>
+                  </p:par>
+                  <p:par>
+                    <p:cTn id="21" fill="hold">
+                      <p:stCondLst>
+                        <p:cond delay="indefinite"/>
+                      </p:stCondLst>
+                      <p:childTnLst>
+                        <p:par>
+                          <p:cTn id="22" fill="hold">
+                            <p:stCondLst>
+                              <p:cond delay="0"/>
+                            </p:stCondLst>
+                            <p:childTnLst>
+                              <p:par>
+                                <p:cTn id="23" presetClass="entr" nodeType="clickEffect" presetSubtype="0" presetID="1" grpId="1" fill="hold">
+                                  <p:stCondLst>
+                                    <p:cond delay="0"/>
+                                  </p:stCondLst>
+                                  <p:iterate type="el" backwards="0">
+                                    <p:tmAbs val="0"/>
+                                  </p:iterate>
+                                  <p:childTnLst>
+                                    <p:set>
+                                      <p:cBhvr>
+                                        <p:cTn id="24" fill="hold"/>
+                                        <p:tgtEl>
+                                          <p:spTgt spid="54">
+                                            <p:txEl>
+                                              <p:pRg st="4" end="4"/>
+                                            </p:txEl>
+                                          </p:spTgt>
+                                        </p:tgtEl>
+                                        <p:attrNameLst>
+                                          <p:attrName>style.visibility</p:attrName>
+                                        </p:attrNameLst>
+                                      </p:cBhvr>
+                                      <p:to>
+                                        <p:strVal val="visible"/>
+                                      </p:to>
+                                    </p:set>
+                                  </p:childTnLst>
+                                </p:cTn>
+                              </p:par>
+                            </p:childTnLst>
+                          </p:cTn>
+                        </p:par>
+                      </p:childTnLst>
+                    </p:cTn>
+                  </p:par>
+                  <p:par>
+                    <p:cTn id="25" fill="hold">
+                      <p:stCondLst>
+                        <p:cond delay="indefinite"/>
+                      </p:stCondLst>
+                      <p:childTnLst>
+                        <p:par>
+                          <p:cTn id="26" fill="hold">
+                            <p:stCondLst>
+                              <p:cond delay="0"/>
+                            </p:stCondLst>
+                            <p:childTnLst>
+                              <p:par>
+                                <p:cTn id="27" presetClass="entr" nodeType="clickEffect" presetSubtype="0" presetID="1" grpId="1" fill="hold">
+                                  <p:stCondLst>
+                                    <p:cond delay="0"/>
+                                  </p:stCondLst>
+                                  <p:iterate type="el" backwards="0">
+                                    <p:tmAbs val="0"/>
+                                  </p:iterate>
+                                  <p:childTnLst>
+                                    <p:set>
+                                      <p:cBhvr>
+                                        <p:cTn id="28" fill="hold"/>
+                                        <p:tgtEl>
+                                          <p:spTgt spid="54">
+                                            <p:txEl>
+                                              <p:pRg st="5" end="5"/>
+                                            </p:txEl>
+                                          </p:spTgt>
+                                        </p:tgtEl>
+                                        <p:attrNameLst>
+                                          <p:attrName>style.visibility</p:attrName>
+                                        </p:attrNameLst>
+                                      </p:cBhvr>
+                                      <p:to>
+                                        <p:strVal val="visible"/>
+                                      </p:to>
+                                    </p:set>
+                                  </p:childTnLst>
+                                </p:cTn>
+                              </p:par>
+                            </p:childTnLst>
+                          </p:cTn>
+                        </p:par>
+                      </p:childTnLst>
+                    </p:cTn>
+                  </p:par>
+                  <p:par>
+                    <p:cTn id="29" fill="hold">
+                      <p:stCondLst>
+                        <p:cond delay="indefinite"/>
+                      </p:stCondLst>
+                      <p:childTnLst>
+                        <p:par>
+                          <p:cTn id="30" fill="hold">
+                            <p:stCondLst>
+                              <p:cond delay="0"/>
+                            </p:stCondLst>
+                            <p:childTnLst>
+                              <p:par>
+                                <p:cTn id="31" presetClass="entr" nodeType="clickEffect" presetSubtype="0" presetID="1" grpId="1" fill="hold">
+                                  <p:stCondLst>
+                                    <p:cond delay="0"/>
+                                  </p:stCondLst>
+                                  <p:iterate type="el" backwards="0">
+                                    <p:tmAbs val="0"/>
+                                  </p:iterate>
+                                  <p:childTnLst>
+                                    <p:set>
+                                      <p:cBhvr>
+                                        <p:cTn id="32" fill="hold"/>
+                                        <p:tgtEl>
+                                          <p:spTgt spid="54">
+                                            <p:txEl>
+                                              <p:pRg st="6" end="6"/>
+                                            </p:txEl>
+                                          </p:spTgt>
+                                        </p:tgtEl>
+                                        <p:attrNameLst>
+                                          <p:attrName>style.visibility</p:attrName>
+                                        </p:attrNameLst>
+                                      </p:cBhvr>
+                                      <p:to>
+                                        <p:strVal val="visible"/>
+                                      </p:to>
+                                    </p:set>
+                                  </p:childTnLst>
+                                </p:cTn>
+                              </p:par>
+                            </p:childTnLst>
+                          </p:cTn>
+                        </p:par>
+                      </p:childTnLst>
+                    </p:cTn>
+                  </p:par>
+                  <p:par>
+                    <p:cTn id="33" fill="hold">
+                      <p:stCondLst>
+                        <p:cond delay="indefinite"/>
+                      </p:stCondLst>
+                      <p:childTnLst>
+                        <p:par>
+                          <p:cTn id="34" fill="hold">
+                            <p:stCondLst>
+                              <p:cond delay="0"/>
+                            </p:stCondLst>
+                            <p:childTnLst>
+                              <p:par>
+                                <p:cTn id="35" presetClass="entr" nodeType="clickEffect" presetSubtype="0" presetID="1" grpId="1" fill="hold">
+                                  <p:stCondLst>
+                                    <p:cond delay="0"/>
+                                  </p:stCondLst>
+                                  <p:iterate type="el" backwards="0">
+                                    <p:tmAbs val="0"/>
+                                  </p:iterate>
+                                  <p:childTnLst>
+                                    <p:set>
+                                      <p:cBhvr>
+                                        <p:cTn id="36" fill="hold"/>
+                                        <p:tgtEl>
+                                          <p:spTgt spid="54">
+                                            <p:txEl>
+                                              <p:pRg st="7" end="7"/>
+                                            </p:txEl>
+                                          </p:spTgt>
+                                        </p:tgtEl>
+                                        <p:attrNameLst>
+                                          <p:attrName>style.visibility</p:attrName>
+                                        </p:attrNameLst>
+                                      </p:cBhvr>
+                                      <p:to>
+                                        <p:strVal val="visible"/>
+                                      </p:to>
+                                    </p:set>
+                                  </p:childTnLst>
+                                </p:cTn>
+                              </p:par>
+                            </p:childTnLst>
+                          </p:cTn>
+                        </p:par>
+                      </p:childTnLst>
+                    </p:cTn>
+                  </p:par>
                 </p:childTnLst>
               </p:cTn>
               <p:prevCondLst>
@@ -3372,7 +3708,7 @@
       </p:sp>
       <p:sp>
         <p:nvSpPr>
-          <p:cNvPr id="60" name="Approach 1:…"/>
+          <p:cNvPr id="60" name="Approach 1: Using Adjacency matrix…"/>
           <p:cNvSpPr txBox="1"/>
           <p:nvPr>
             <p:ph type="body" idx="1"/>
@@ -3414,8 +3750,20 @@
               <a:t>1</a:t>
             </a:r>
             <a:r>
-              <a:t>:</a:t>
-            </a:r>
+              <a:rPr>
+                <a:latin typeface="Gill Sans MT"/>
+                <a:ea typeface="Gill Sans MT"/>
+                <a:cs typeface="Gill Sans MT"/>
+                <a:sym typeface="Gill Sans MT"/>
+              </a:rPr>
+              <a:t>: Using Adjacency matrix</a:t>
+            </a:r>
+            <a:endParaRPr>
+              <a:latin typeface="Gill Sans MT"/>
+              <a:ea typeface="Gill Sans MT"/>
+              <a:cs typeface="Gill Sans MT"/>
+              <a:sym typeface="Gill Sans MT"/>
+            </a:endParaRPr>
           </a:p>
           <a:p>
             <a:pPr lvl="1" marL="700087" indent="-304800">
@@ -3430,7 +3778,7 @@
               </a:defRPr>
             </a:pPr>
             <a:r>
-              <a:t>Build an adjacency matrix A</a:t>
+              <a:t>Build a graph with adjacency matrix A</a:t>
             </a:r>
           </a:p>
           <a:p>
@@ -3471,7 +3819,25 @@
                 <a:cs typeface="Courier New"/>
                 <a:sym typeface="Courier New"/>
               </a:rPr>
-              <a:t>n(n-1) =O(n2)</a:t>
+              <a:t>n(n-1) =O(n</a:t>
+            </a:r>
+            <a:r>
+              <a:rPr baseline="31999">
+                <a:latin typeface="Courier New"/>
+                <a:ea typeface="Courier New"/>
+                <a:cs typeface="Courier New"/>
+                <a:sym typeface="Courier New"/>
+              </a:rPr>
+              <a:t>2</a:t>
+            </a:r>
+            <a:r>
+              <a:rPr>
+                <a:latin typeface="Courier New"/>
+                <a:ea typeface="Courier New"/>
+                <a:cs typeface="Courier New"/>
+                <a:sym typeface="Courier New"/>
+              </a:rPr>
+              <a:t>)</a:t>
             </a:r>
             <a:endParaRPr>
               <a:latin typeface="Courier New"/>
@@ -3579,7 +3945,7 @@
               </a:defRPr>
             </a:pPr>
             <a:r>
-              <a:t>Find a colum </a:t>
+              <a:t>Find a column </a:t>
             </a:r>
             <a:r>
               <a:rPr>
@@ -3854,7 +4220,471 @@
                                       <p:cBhvr>
                                         <p:cTn id="6" fill="hold"/>
                                         <p:tgtEl>
-                                          <p:spTgt spid="60"/>
+                                          <p:spTgt spid="60">
+                                            <p:bg/>
+                                          </p:spTgt>
+                                        </p:tgtEl>
+                                        <p:attrNameLst>
+                                          <p:attrName>style.visibility</p:attrName>
+                                        </p:attrNameLst>
+                                      </p:cBhvr>
+                                      <p:to>
+                                        <p:strVal val="visible"/>
+                                      </p:to>
+                                    </p:set>
+                                  </p:childTnLst>
+                                </p:cTn>
+                              </p:par>
+                              <p:par>
+                                <p:cTn id="7" presetClass="entr" nodeType="withEffect" presetSubtype="0" presetID="1" grpId="1" fill="hold">
+                                  <p:stCondLst>
+                                    <p:cond delay="0"/>
+                                  </p:stCondLst>
+                                  <p:iterate type="el" backwards="0">
+                                    <p:tmAbs val="0"/>
+                                  </p:iterate>
+                                  <p:childTnLst>
+                                    <p:set>
+                                      <p:cBhvr>
+                                        <p:cTn id="8" fill="hold"/>
+                                        <p:tgtEl>
+                                          <p:spTgt spid="60">
+                                            <p:txEl>
+                                              <p:pRg st="0" end="0"/>
+                                            </p:txEl>
+                                          </p:spTgt>
+                                        </p:tgtEl>
+                                        <p:attrNameLst>
+                                          <p:attrName>style.visibility</p:attrName>
+                                        </p:attrNameLst>
+                                      </p:cBhvr>
+                                      <p:to>
+                                        <p:strVal val="visible"/>
+                                      </p:to>
+                                    </p:set>
+                                  </p:childTnLst>
+                                </p:cTn>
+                              </p:par>
+                            </p:childTnLst>
+                          </p:cTn>
+                        </p:par>
+                      </p:childTnLst>
+                    </p:cTn>
+                  </p:par>
+                  <p:par>
+                    <p:cTn id="9" fill="hold">
+                      <p:stCondLst>
+                        <p:cond delay="indefinite"/>
+                      </p:stCondLst>
+                      <p:childTnLst>
+                        <p:par>
+                          <p:cTn id="10" fill="hold">
+                            <p:stCondLst>
+                              <p:cond delay="0"/>
+                            </p:stCondLst>
+                            <p:childTnLst>
+                              <p:par>
+                                <p:cTn id="11" presetClass="entr" nodeType="clickEffect" presetSubtype="0" presetID="1" grpId="1" fill="hold">
+                                  <p:stCondLst>
+                                    <p:cond delay="0"/>
+                                  </p:stCondLst>
+                                  <p:iterate type="el" backwards="0">
+                                    <p:tmAbs val="0"/>
+                                  </p:iterate>
+                                  <p:childTnLst>
+                                    <p:set>
+                                      <p:cBhvr>
+                                        <p:cTn id="12" fill="hold"/>
+                                        <p:tgtEl>
+                                          <p:spTgt spid="60">
+                                            <p:txEl>
+                                              <p:pRg st="1" end="1"/>
+                                            </p:txEl>
+                                          </p:spTgt>
+                                        </p:tgtEl>
+                                        <p:attrNameLst>
+                                          <p:attrName>style.visibility</p:attrName>
+                                        </p:attrNameLst>
+                                      </p:cBhvr>
+                                      <p:to>
+                                        <p:strVal val="visible"/>
+                                      </p:to>
+                                    </p:set>
+                                  </p:childTnLst>
+                                </p:cTn>
+                              </p:par>
+                            </p:childTnLst>
+                          </p:cTn>
+                        </p:par>
+                      </p:childTnLst>
+                    </p:cTn>
+                  </p:par>
+                  <p:par>
+                    <p:cTn id="13" fill="hold">
+                      <p:stCondLst>
+                        <p:cond delay="indefinite"/>
+                      </p:stCondLst>
+                      <p:childTnLst>
+                        <p:par>
+                          <p:cTn id="14" fill="hold">
+                            <p:stCondLst>
+                              <p:cond delay="0"/>
+                            </p:stCondLst>
+                            <p:childTnLst>
+                              <p:par>
+                                <p:cTn id="15" presetClass="entr" nodeType="clickEffect" presetSubtype="0" presetID="1" grpId="1" fill="hold">
+                                  <p:stCondLst>
+                                    <p:cond delay="0"/>
+                                  </p:stCondLst>
+                                  <p:iterate type="el" backwards="0">
+                                    <p:tmAbs val="0"/>
+                                  </p:iterate>
+                                  <p:childTnLst>
+                                    <p:set>
+                                      <p:cBhvr>
+                                        <p:cTn id="16" fill="hold"/>
+                                        <p:tgtEl>
+                                          <p:spTgt spid="60">
+                                            <p:txEl>
+                                              <p:pRg st="2" end="2"/>
+                                            </p:txEl>
+                                          </p:spTgt>
+                                        </p:tgtEl>
+                                        <p:attrNameLst>
+                                          <p:attrName>style.visibility</p:attrName>
+                                        </p:attrNameLst>
+                                      </p:cBhvr>
+                                      <p:to>
+                                        <p:strVal val="visible"/>
+                                      </p:to>
+                                    </p:set>
+                                  </p:childTnLst>
+                                </p:cTn>
+                              </p:par>
+                            </p:childTnLst>
+                          </p:cTn>
+                        </p:par>
+                      </p:childTnLst>
+                    </p:cTn>
+                  </p:par>
+                  <p:par>
+                    <p:cTn id="17" fill="hold">
+                      <p:stCondLst>
+                        <p:cond delay="indefinite"/>
+                      </p:stCondLst>
+                      <p:childTnLst>
+                        <p:par>
+                          <p:cTn id="18" fill="hold">
+                            <p:stCondLst>
+                              <p:cond delay="0"/>
+                            </p:stCondLst>
+                            <p:childTnLst>
+                              <p:par>
+                                <p:cTn id="19" presetClass="entr" nodeType="clickEffect" presetSubtype="0" presetID="1" grpId="1" fill="hold">
+                                  <p:stCondLst>
+                                    <p:cond delay="0"/>
+                                  </p:stCondLst>
+                                  <p:iterate type="el" backwards="0">
+                                    <p:tmAbs val="0"/>
+                                  </p:iterate>
+                                  <p:childTnLst>
+                                    <p:set>
+                                      <p:cBhvr>
+                                        <p:cTn id="20" fill="hold"/>
+                                        <p:tgtEl>
+                                          <p:spTgt spid="60">
+                                            <p:txEl>
+                                              <p:pRg st="3" end="3"/>
+                                            </p:txEl>
+                                          </p:spTgt>
+                                        </p:tgtEl>
+                                        <p:attrNameLst>
+                                          <p:attrName>style.visibility</p:attrName>
+                                        </p:attrNameLst>
+                                      </p:cBhvr>
+                                      <p:to>
+                                        <p:strVal val="visible"/>
+                                      </p:to>
+                                    </p:set>
+                                  </p:childTnLst>
+                                </p:cTn>
+                              </p:par>
+                            </p:childTnLst>
+                          </p:cTn>
+                        </p:par>
+                      </p:childTnLst>
+                    </p:cTn>
+                  </p:par>
+                  <p:par>
+                    <p:cTn id="21" fill="hold">
+                      <p:stCondLst>
+                        <p:cond delay="indefinite"/>
+                      </p:stCondLst>
+                      <p:childTnLst>
+                        <p:par>
+                          <p:cTn id="22" fill="hold">
+                            <p:stCondLst>
+                              <p:cond delay="0"/>
+                            </p:stCondLst>
+                            <p:childTnLst>
+                              <p:par>
+                                <p:cTn id="23" presetClass="entr" nodeType="clickEffect" presetSubtype="0" presetID="1" grpId="1" fill="hold">
+                                  <p:stCondLst>
+                                    <p:cond delay="0"/>
+                                  </p:stCondLst>
+                                  <p:iterate type="el" backwards="0">
+                                    <p:tmAbs val="0"/>
+                                  </p:iterate>
+                                  <p:childTnLst>
+                                    <p:set>
+                                      <p:cBhvr>
+                                        <p:cTn id="24" fill="hold"/>
+                                        <p:tgtEl>
+                                          <p:spTgt spid="60">
+                                            <p:txEl>
+                                              <p:pRg st="4" end="4"/>
+                                            </p:txEl>
+                                          </p:spTgt>
+                                        </p:tgtEl>
+                                        <p:attrNameLst>
+                                          <p:attrName>style.visibility</p:attrName>
+                                        </p:attrNameLst>
+                                      </p:cBhvr>
+                                      <p:to>
+                                        <p:strVal val="visible"/>
+                                      </p:to>
+                                    </p:set>
+                                  </p:childTnLst>
+                                </p:cTn>
+                              </p:par>
+                            </p:childTnLst>
+                          </p:cTn>
+                        </p:par>
+                      </p:childTnLst>
+                    </p:cTn>
+                  </p:par>
+                  <p:par>
+                    <p:cTn id="25" fill="hold">
+                      <p:stCondLst>
+                        <p:cond delay="indefinite"/>
+                      </p:stCondLst>
+                      <p:childTnLst>
+                        <p:par>
+                          <p:cTn id="26" fill="hold">
+                            <p:stCondLst>
+                              <p:cond delay="0"/>
+                            </p:stCondLst>
+                            <p:childTnLst>
+                              <p:par>
+                                <p:cTn id="27" presetClass="entr" nodeType="clickEffect" presetSubtype="0" presetID="1" grpId="1" fill="hold">
+                                  <p:stCondLst>
+                                    <p:cond delay="0"/>
+                                  </p:stCondLst>
+                                  <p:iterate type="el" backwards="0">
+                                    <p:tmAbs val="0"/>
+                                  </p:iterate>
+                                  <p:childTnLst>
+                                    <p:set>
+                                      <p:cBhvr>
+                                        <p:cTn id="28" fill="hold"/>
+                                        <p:tgtEl>
+                                          <p:spTgt spid="60">
+                                            <p:txEl>
+                                              <p:pRg st="5" end="5"/>
+                                            </p:txEl>
+                                          </p:spTgt>
+                                        </p:tgtEl>
+                                        <p:attrNameLst>
+                                          <p:attrName>style.visibility</p:attrName>
+                                        </p:attrNameLst>
+                                      </p:cBhvr>
+                                      <p:to>
+                                        <p:strVal val="visible"/>
+                                      </p:to>
+                                    </p:set>
+                                  </p:childTnLst>
+                                </p:cTn>
+                              </p:par>
+                            </p:childTnLst>
+                          </p:cTn>
+                        </p:par>
+                      </p:childTnLst>
+                    </p:cTn>
+                  </p:par>
+                  <p:par>
+                    <p:cTn id="29" fill="hold">
+                      <p:stCondLst>
+                        <p:cond delay="indefinite"/>
+                      </p:stCondLst>
+                      <p:childTnLst>
+                        <p:par>
+                          <p:cTn id="30" fill="hold">
+                            <p:stCondLst>
+                              <p:cond delay="0"/>
+                            </p:stCondLst>
+                            <p:childTnLst>
+                              <p:par>
+                                <p:cTn id="31" presetClass="entr" nodeType="clickEffect" presetSubtype="0" presetID="1" grpId="1" fill="hold">
+                                  <p:stCondLst>
+                                    <p:cond delay="0"/>
+                                  </p:stCondLst>
+                                  <p:iterate type="el" backwards="0">
+                                    <p:tmAbs val="0"/>
+                                  </p:iterate>
+                                  <p:childTnLst>
+                                    <p:set>
+                                      <p:cBhvr>
+                                        <p:cTn id="32" fill="hold"/>
+                                        <p:tgtEl>
+                                          <p:spTgt spid="60">
+                                            <p:txEl>
+                                              <p:pRg st="6" end="6"/>
+                                            </p:txEl>
+                                          </p:spTgt>
+                                        </p:tgtEl>
+                                        <p:attrNameLst>
+                                          <p:attrName>style.visibility</p:attrName>
+                                        </p:attrNameLst>
+                                      </p:cBhvr>
+                                      <p:to>
+                                        <p:strVal val="visible"/>
+                                      </p:to>
+                                    </p:set>
+                                  </p:childTnLst>
+                                </p:cTn>
+                              </p:par>
+                            </p:childTnLst>
+                          </p:cTn>
+                        </p:par>
+                      </p:childTnLst>
+                    </p:cTn>
+                  </p:par>
+                  <p:par>
+                    <p:cTn id="33" fill="hold">
+                      <p:stCondLst>
+                        <p:cond delay="indefinite"/>
+                      </p:stCondLst>
+                      <p:childTnLst>
+                        <p:par>
+                          <p:cTn id="34" fill="hold">
+                            <p:stCondLst>
+                              <p:cond delay="0"/>
+                            </p:stCondLst>
+                            <p:childTnLst>
+                              <p:par>
+                                <p:cTn id="35" presetClass="entr" nodeType="clickEffect" presetSubtype="0" presetID="1" grpId="1" fill="hold">
+                                  <p:stCondLst>
+                                    <p:cond delay="0"/>
+                                  </p:stCondLst>
+                                  <p:iterate type="el" backwards="0">
+                                    <p:tmAbs val="0"/>
+                                  </p:iterate>
+                                  <p:childTnLst>
+                                    <p:set>
+                                      <p:cBhvr>
+                                        <p:cTn id="36" fill="hold"/>
+                                        <p:tgtEl>
+                                          <p:spTgt spid="60">
+                                            <p:txEl>
+                                              <p:pRg st="7" end="7"/>
+                                            </p:txEl>
+                                          </p:spTgt>
+                                        </p:tgtEl>
+                                        <p:attrNameLst>
+                                          <p:attrName>style.visibility</p:attrName>
+                                        </p:attrNameLst>
+                                      </p:cBhvr>
+                                      <p:to>
+                                        <p:strVal val="visible"/>
+                                      </p:to>
+                                    </p:set>
+                                  </p:childTnLst>
+                                </p:cTn>
+                              </p:par>
+                            </p:childTnLst>
+                          </p:cTn>
+                        </p:par>
+                      </p:childTnLst>
+                    </p:cTn>
+                  </p:par>
+                  <p:par>
+                    <p:cTn id="37" fill="hold">
+                      <p:stCondLst>
+                        <p:cond delay="indefinite"/>
+                      </p:stCondLst>
+                      <p:childTnLst>
+                        <p:par>
+                          <p:cTn id="38" fill="hold">
+                            <p:stCondLst>
+                              <p:cond delay="0"/>
+                            </p:stCondLst>
+                            <p:childTnLst>
+                              <p:par>
+                                <p:cTn id="39" presetClass="entr" nodeType="clickEffect" presetSubtype="0" presetID="1" grpId="1" fill="hold">
+                                  <p:stCondLst>
+                                    <p:cond delay="0"/>
+                                  </p:stCondLst>
+                                  <p:iterate type="el" backwards="0">
+                                    <p:tmAbs val="0"/>
+                                  </p:iterate>
+                                  <p:childTnLst>
+                                    <p:set>
+                                      <p:cBhvr>
+                                        <p:cTn id="40" fill="hold"/>
+                                        <p:tgtEl>
+                                          <p:spTgt spid="60">
+                                            <p:txEl>
+                                              <p:pRg st="8" end="8"/>
+                                            </p:txEl>
+                                          </p:spTgt>
+                                        </p:tgtEl>
+                                        <p:attrNameLst>
+                                          <p:attrName>style.visibility</p:attrName>
+                                        </p:attrNameLst>
+                                      </p:cBhvr>
+                                      <p:to>
+                                        <p:strVal val="visible"/>
+                                      </p:to>
+                                    </p:set>
+                                  </p:childTnLst>
+                                </p:cTn>
+                              </p:par>
+                            </p:childTnLst>
+                          </p:cTn>
+                        </p:par>
+                      </p:childTnLst>
+                    </p:cTn>
+                  </p:par>
+                  <p:par>
+                    <p:cTn id="41" fill="hold">
+                      <p:stCondLst>
+                        <p:cond delay="indefinite"/>
+                      </p:stCondLst>
+                      <p:childTnLst>
+                        <p:par>
+                          <p:cTn id="42" fill="hold">
+                            <p:stCondLst>
+                              <p:cond delay="0"/>
+                            </p:stCondLst>
+                            <p:childTnLst>
+                              <p:par>
+                                <p:cTn id="43" presetClass="entr" nodeType="clickEffect" presetSubtype="0" presetID="1" grpId="1" fill="hold">
+                                  <p:stCondLst>
+                                    <p:cond delay="0"/>
+                                  </p:stCondLst>
+                                  <p:iterate type="el" backwards="0">
+                                    <p:tmAbs val="0"/>
+                                  </p:iterate>
+                                  <p:childTnLst>
+                                    <p:set>
+                                      <p:cBhvr>
+                                        <p:cTn id="44" fill="hold"/>
+                                        <p:tgtEl>
+                                          <p:spTgt spid="60">
+                                            <p:txEl>
+                                              <p:pRg st="9" end="9"/>
+                                            </p:txEl>
+                                          </p:spTgt>
                                         </p:tgtEl>
                                         <p:attrNameLst>
                                           <p:attrName>style.visibility</p:attrName>
@@ -3895,7 +4725,7 @@
       </p:par>
     </p:tnLst>
     <p:bldLst>
-      <p:bldP build="whole" bldLvl="1" animBg="1" rev="0" advAuto="0" spid="60" grpId="1"/>
+      <p:bldP build="p" bldLvl="5" animBg="1" rev="0" advAuto="0" spid="60" grpId="1"/>
     </p:bldLst>
   </p:timing>
 </p:sld>
@@ -3944,7 +4774,7 @@
       </p:sp>
       <p:sp>
         <p:nvSpPr>
-          <p:cNvPr id="66" name="Approach 2:…"/>
+          <p:cNvPr id="66" name="Approach 2:Using Adjacency List…"/>
           <p:cNvSpPr txBox="1"/>
           <p:nvPr>
             <p:ph type="body" idx="1"/>
@@ -3988,6 +4818,15 @@
             <a:r>
               <a:t>:</a:t>
             </a:r>
+            <a:r>
+              <a:rPr>
+                <a:latin typeface="Gill Sans MT"/>
+                <a:ea typeface="Gill Sans MT"/>
+                <a:cs typeface="Gill Sans MT"/>
+                <a:sym typeface="Gill Sans MT"/>
+              </a:rPr>
+              <a:t>Using Adjacency List</a:t>
+            </a:r>
           </a:p>
           <a:p>
             <a:pPr lvl="1" marL="700087" indent="-304800">
@@ -4002,7 +4841,7 @@
               </a:defRPr>
             </a:pPr>
             <a:r>
-              <a:t>Build a graph</a:t>
+              <a:t>Build a graph with Adjacency List</a:t>
             </a:r>
           </a:p>
           <a:p>
@@ -4043,7 +4882,25 @@
                 <a:cs typeface="Courier New"/>
                 <a:sym typeface="Courier New"/>
               </a:rPr>
-              <a:t>n(n-1) =O(n2)</a:t>
+              <a:t>n(n-1) =O(n</a:t>
+            </a:r>
+            <a:r>
+              <a:rPr baseline="31999">
+                <a:latin typeface="Courier New"/>
+                <a:ea typeface="Courier New"/>
+                <a:cs typeface="Courier New"/>
+                <a:sym typeface="Courier New"/>
+              </a:rPr>
+              <a:t>2</a:t>
+            </a:r>
+            <a:r>
+              <a:rPr>
+                <a:latin typeface="Courier New"/>
+                <a:ea typeface="Courier New"/>
+                <a:cs typeface="Courier New"/>
+                <a:sym typeface="Courier New"/>
+              </a:rPr>
+              <a:t>)</a:t>
             </a:r>
             <a:endParaRPr>
               <a:latin typeface="Courier New"/>
@@ -4375,7 +5232,423 @@
                                       <p:cBhvr>
                                         <p:cTn id="6" fill="hold"/>
                                         <p:tgtEl>
-                                          <p:spTgt spid="66"/>
+                                          <p:spTgt spid="66">
+                                            <p:bg/>
+                                          </p:spTgt>
+                                        </p:tgtEl>
+                                        <p:attrNameLst>
+                                          <p:attrName>style.visibility</p:attrName>
+                                        </p:attrNameLst>
+                                      </p:cBhvr>
+                                      <p:to>
+                                        <p:strVal val="visible"/>
+                                      </p:to>
+                                    </p:set>
+                                  </p:childTnLst>
+                                </p:cTn>
+                              </p:par>
+                              <p:par>
+                                <p:cTn id="7" presetClass="entr" nodeType="withEffect" presetSubtype="0" presetID="1" grpId="1" fill="hold">
+                                  <p:stCondLst>
+                                    <p:cond delay="0"/>
+                                  </p:stCondLst>
+                                  <p:iterate type="el" backwards="0">
+                                    <p:tmAbs val="0"/>
+                                  </p:iterate>
+                                  <p:childTnLst>
+                                    <p:set>
+                                      <p:cBhvr>
+                                        <p:cTn id="8" fill="hold"/>
+                                        <p:tgtEl>
+                                          <p:spTgt spid="66">
+                                            <p:txEl>
+                                              <p:pRg st="0" end="0"/>
+                                            </p:txEl>
+                                          </p:spTgt>
+                                        </p:tgtEl>
+                                        <p:attrNameLst>
+                                          <p:attrName>style.visibility</p:attrName>
+                                        </p:attrNameLst>
+                                      </p:cBhvr>
+                                      <p:to>
+                                        <p:strVal val="visible"/>
+                                      </p:to>
+                                    </p:set>
+                                  </p:childTnLst>
+                                </p:cTn>
+                              </p:par>
+                            </p:childTnLst>
+                          </p:cTn>
+                        </p:par>
+                      </p:childTnLst>
+                    </p:cTn>
+                  </p:par>
+                  <p:par>
+                    <p:cTn id="9" fill="hold">
+                      <p:stCondLst>
+                        <p:cond delay="indefinite"/>
+                      </p:stCondLst>
+                      <p:childTnLst>
+                        <p:par>
+                          <p:cTn id="10" fill="hold">
+                            <p:stCondLst>
+                              <p:cond delay="0"/>
+                            </p:stCondLst>
+                            <p:childTnLst>
+                              <p:par>
+                                <p:cTn id="11" presetClass="entr" nodeType="clickEffect" presetSubtype="0" presetID="1" grpId="1" fill="hold">
+                                  <p:stCondLst>
+                                    <p:cond delay="0"/>
+                                  </p:stCondLst>
+                                  <p:iterate type="el" backwards="0">
+                                    <p:tmAbs val="0"/>
+                                  </p:iterate>
+                                  <p:childTnLst>
+                                    <p:set>
+                                      <p:cBhvr>
+                                        <p:cTn id="12" fill="hold"/>
+                                        <p:tgtEl>
+                                          <p:spTgt spid="66">
+                                            <p:txEl>
+                                              <p:pRg st="1" end="1"/>
+                                            </p:txEl>
+                                          </p:spTgt>
+                                        </p:tgtEl>
+                                        <p:attrNameLst>
+                                          <p:attrName>style.visibility</p:attrName>
+                                        </p:attrNameLst>
+                                      </p:cBhvr>
+                                      <p:to>
+                                        <p:strVal val="visible"/>
+                                      </p:to>
+                                    </p:set>
+                                  </p:childTnLst>
+                                </p:cTn>
+                              </p:par>
+                            </p:childTnLst>
+                          </p:cTn>
+                        </p:par>
+                      </p:childTnLst>
+                    </p:cTn>
+                  </p:par>
+                  <p:par>
+                    <p:cTn id="13" fill="hold">
+                      <p:stCondLst>
+                        <p:cond delay="indefinite"/>
+                      </p:stCondLst>
+                      <p:childTnLst>
+                        <p:par>
+                          <p:cTn id="14" fill="hold">
+                            <p:stCondLst>
+                              <p:cond delay="0"/>
+                            </p:stCondLst>
+                            <p:childTnLst>
+                              <p:par>
+                                <p:cTn id="15" presetClass="entr" nodeType="clickEffect" presetSubtype="0" presetID="1" grpId="1" fill="hold">
+                                  <p:stCondLst>
+                                    <p:cond delay="0"/>
+                                  </p:stCondLst>
+                                  <p:iterate type="el" backwards="0">
+                                    <p:tmAbs val="0"/>
+                                  </p:iterate>
+                                  <p:childTnLst>
+                                    <p:set>
+                                      <p:cBhvr>
+                                        <p:cTn id="16" fill="hold"/>
+                                        <p:tgtEl>
+                                          <p:spTgt spid="66">
+                                            <p:txEl>
+                                              <p:pRg st="2" end="2"/>
+                                            </p:txEl>
+                                          </p:spTgt>
+                                        </p:tgtEl>
+                                        <p:attrNameLst>
+                                          <p:attrName>style.visibility</p:attrName>
+                                        </p:attrNameLst>
+                                      </p:cBhvr>
+                                      <p:to>
+                                        <p:strVal val="visible"/>
+                                      </p:to>
+                                    </p:set>
+                                  </p:childTnLst>
+                                </p:cTn>
+                              </p:par>
+                            </p:childTnLst>
+                          </p:cTn>
+                        </p:par>
+                      </p:childTnLst>
+                    </p:cTn>
+                  </p:par>
+                  <p:par>
+                    <p:cTn id="17" fill="hold">
+                      <p:stCondLst>
+                        <p:cond delay="indefinite"/>
+                      </p:stCondLst>
+                      <p:childTnLst>
+                        <p:par>
+                          <p:cTn id="18" fill="hold">
+                            <p:stCondLst>
+                              <p:cond delay="0"/>
+                            </p:stCondLst>
+                            <p:childTnLst>
+                              <p:par>
+                                <p:cTn id="19" presetClass="entr" nodeType="clickEffect" presetSubtype="0" presetID="1" grpId="1" fill="hold">
+                                  <p:stCondLst>
+                                    <p:cond delay="0"/>
+                                  </p:stCondLst>
+                                  <p:iterate type="el" backwards="0">
+                                    <p:tmAbs val="0"/>
+                                  </p:iterate>
+                                  <p:childTnLst>
+                                    <p:set>
+                                      <p:cBhvr>
+                                        <p:cTn id="20" fill="hold"/>
+                                        <p:tgtEl>
+                                          <p:spTgt spid="66">
+                                            <p:txEl>
+                                              <p:pRg st="3" end="3"/>
+                                            </p:txEl>
+                                          </p:spTgt>
+                                        </p:tgtEl>
+                                        <p:attrNameLst>
+                                          <p:attrName>style.visibility</p:attrName>
+                                        </p:attrNameLst>
+                                      </p:cBhvr>
+                                      <p:to>
+                                        <p:strVal val="visible"/>
+                                      </p:to>
+                                    </p:set>
+                                  </p:childTnLst>
+                                </p:cTn>
+                              </p:par>
+                            </p:childTnLst>
+                          </p:cTn>
+                        </p:par>
+                      </p:childTnLst>
+                    </p:cTn>
+                  </p:par>
+                  <p:par>
+                    <p:cTn id="21" fill="hold">
+                      <p:stCondLst>
+                        <p:cond delay="indefinite"/>
+                      </p:stCondLst>
+                      <p:childTnLst>
+                        <p:par>
+                          <p:cTn id="22" fill="hold">
+                            <p:stCondLst>
+                              <p:cond delay="0"/>
+                            </p:stCondLst>
+                            <p:childTnLst>
+                              <p:par>
+                                <p:cTn id="23" presetClass="entr" nodeType="clickEffect" presetSubtype="0" presetID="1" grpId="1" fill="hold">
+                                  <p:stCondLst>
+                                    <p:cond delay="0"/>
+                                  </p:stCondLst>
+                                  <p:iterate type="el" backwards="0">
+                                    <p:tmAbs val="0"/>
+                                  </p:iterate>
+                                  <p:childTnLst>
+                                    <p:set>
+                                      <p:cBhvr>
+                                        <p:cTn id="24" fill="hold"/>
+                                        <p:tgtEl>
+                                          <p:spTgt spid="66">
+                                            <p:txEl>
+                                              <p:pRg st="4" end="4"/>
+                                            </p:txEl>
+                                          </p:spTgt>
+                                        </p:tgtEl>
+                                        <p:attrNameLst>
+                                          <p:attrName>style.visibility</p:attrName>
+                                        </p:attrNameLst>
+                                      </p:cBhvr>
+                                      <p:to>
+                                        <p:strVal val="visible"/>
+                                      </p:to>
+                                    </p:set>
+                                  </p:childTnLst>
+                                </p:cTn>
+                              </p:par>
+                            </p:childTnLst>
+                          </p:cTn>
+                        </p:par>
+                      </p:childTnLst>
+                    </p:cTn>
+                  </p:par>
+                  <p:par>
+                    <p:cTn id="25" fill="hold">
+                      <p:stCondLst>
+                        <p:cond delay="indefinite"/>
+                      </p:stCondLst>
+                      <p:childTnLst>
+                        <p:par>
+                          <p:cTn id="26" fill="hold">
+                            <p:stCondLst>
+                              <p:cond delay="0"/>
+                            </p:stCondLst>
+                            <p:childTnLst>
+                              <p:par>
+                                <p:cTn id="27" presetClass="entr" nodeType="clickEffect" presetSubtype="0" presetID="1" grpId="1" fill="hold">
+                                  <p:stCondLst>
+                                    <p:cond delay="0"/>
+                                  </p:stCondLst>
+                                  <p:iterate type="el" backwards="0">
+                                    <p:tmAbs val="0"/>
+                                  </p:iterate>
+                                  <p:childTnLst>
+                                    <p:set>
+                                      <p:cBhvr>
+                                        <p:cTn id="28" fill="hold"/>
+                                        <p:tgtEl>
+                                          <p:spTgt spid="66">
+                                            <p:txEl>
+                                              <p:pRg st="5" end="5"/>
+                                            </p:txEl>
+                                          </p:spTgt>
+                                        </p:tgtEl>
+                                        <p:attrNameLst>
+                                          <p:attrName>style.visibility</p:attrName>
+                                        </p:attrNameLst>
+                                      </p:cBhvr>
+                                      <p:to>
+                                        <p:strVal val="visible"/>
+                                      </p:to>
+                                    </p:set>
+                                  </p:childTnLst>
+                                </p:cTn>
+                              </p:par>
+                            </p:childTnLst>
+                          </p:cTn>
+                        </p:par>
+                      </p:childTnLst>
+                    </p:cTn>
+                  </p:par>
+                  <p:par>
+                    <p:cTn id="29" fill="hold">
+                      <p:stCondLst>
+                        <p:cond delay="indefinite"/>
+                      </p:stCondLst>
+                      <p:childTnLst>
+                        <p:par>
+                          <p:cTn id="30" fill="hold">
+                            <p:stCondLst>
+                              <p:cond delay="0"/>
+                            </p:stCondLst>
+                            <p:childTnLst>
+                              <p:par>
+                                <p:cTn id="31" presetClass="entr" nodeType="clickEffect" presetSubtype="0" presetID="1" grpId="1" fill="hold">
+                                  <p:stCondLst>
+                                    <p:cond delay="0"/>
+                                  </p:stCondLst>
+                                  <p:iterate type="el" backwards="0">
+                                    <p:tmAbs val="0"/>
+                                  </p:iterate>
+                                  <p:childTnLst>
+                                    <p:set>
+                                      <p:cBhvr>
+                                        <p:cTn id="32" fill="hold"/>
+                                        <p:tgtEl>
+                                          <p:spTgt spid="66">
+                                            <p:txEl>
+                                              <p:pRg st="6" end="6"/>
+                                            </p:txEl>
+                                          </p:spTgt>
+                                        </p:tgtEl>
+                                        <p:attrNameLst>
+                                          <p:attrName>style.visibility</p:attrName>
+                                        </p:attrNameLst>
+                                      </p:cBhvr>
+                                      <p:to>
+                                        <p:strVal val="visible"/>
+                                      </p:to>
+                                    </p:set>
+                                  </p:childTnLst>
+                                </p:cTn>
+                              </p:par>
+                            </p:childTnLst>
+                          </p:cTn>
+                        </p:par>
+                      </p:childTnLst>
+                    </p:cTn>
+                  </p:par>
+                  <p:par>
+                    <p:cTn id="33" fill="hold">
+                      <p:stCondLst>
+                        <p:cond delay="indefinite"/>
+                      </p:stCondLst>
+                      <p:childTnLst>
+                        <p:par>
+                          <p:cTn id="34" fill="hold">
+                            <p:stCondLst>
+                              <p:cond delay="0"/>
+                            </p:stCondLst>
+                            <p:childTnLst>
+                              <p:par>
+                                <p:cTn id="35" presetClass="entr" nodeType="clickEffect" presetSubtype="0" presetID="1" grpId="1" fill="hold">
+                                  <p:stCondLst>
+                                    <p:cond delay="0"/>
+                                  </p:stCondLst>
+                                  <p:iterate type="el" backwards="0">
+                                    <p:tmAbs val="0"/>
+                                  </p:iterate>
+                                  <p:childTnLst>
+                                    <p:set>
+                                      <p:cBhvr>
+                                        <p:cTn id="36" fill="hold"/>
+                                        <p:tgtEl>
+                                          <p:spTgt spid="66">
+                                            <p:txEl>
+                                              <p:pRg st="7" end="7"/>
+                                            </p:txEl>
+                                          </p:spTgt>
+                                        </p:tgtEl>
+                                        <p:attrNameLst>
+                                          <p:attrName>style.visibility</p:attrName>
+                                        </p:attrNameLst>
+                                      </p:cBhvr>
+                                      <p:to>
+                                        <p:strVal val="visible"/>
+                                      </p:to>
+                                    </p:set>
+                                  </p:childTnLst>
+                                </p:cTn>
+                              </p:par>
+                            </p:childTnLst>
+                          </p:cTn>
+                        </p:par>
+                      </p:childTnLst>
+                    </p:cTn>
+                  </p:par>
+                  <p:par>
+                    <p:cTn id="37" fill="hold">
+                      <p:stCondLst>
+                        <p:cond delay="indefinite"/>
+                      </p:stCondLst>
+                      <p:childTnLst>
+                        <p:par>
+                          <p:cTn id="38" fill="hold">
+                            <p:stCondLst>
+                              <p:cond delay="0"/>
+                            </p:stCondLst>
+                            <p:childTnLst>
+                              <p:par>
+                                <p:cTn id="39" presetClass="entr" nodeType="clickEffect" presetSubtype="0" presetID="1" grpId="1" fill="hold">
+                                  <p:stCondLst>
+                                    <p:cond delay="0"/>
+                                  </p:stCondLst>
+                                  <p:iterate type="el" backwards="0">
+                                    <p:tmAbs val="0"/>
+                                  </p:iterate>
+                                  <p:childTnLst>
+                                    <p:set>
+                                      <p:cBhvr>
+                                        <p:cTn id="40" fill="hold"/>
+                                        <p:tgtEl>
+                                          <p:spTgt spid="66">
+                                            <p:txEl>
+                                              <p:pRg st="8" end="8"/>
+                                            </p:txEl>
+                                          </p:spTgt>
                                         </p:tgtEl>
                                         <p:attrNameLst>
                                           <p:attrName>style.visibility</p:attrName>
@@ -4416,7 +5689,7 @@
       </p:par>
     </p:tnLst>
     <p:bldLst>
-      <p:bldP build="whole" bldLvl="1" animBg="1" rev="0" advAuto="0" spid="66" grpId="1"/>
+      <p:bldP build="p" bldLvl="5" animBg="1" rev="0" advAuto="0" spid="66" grpId="1"/>
     </p:bldLst>
   </p:timing>
 </p:sld>
@@ -4639,7 +5912,7 @@
               <a:t>N</a:t>
             </a:r>
             <a:r>
-              <a:t> does not anyone, </a:t>
+              <a:t> does not know anyone, </a:t>
             </a:r>
             <a:r>
               <a:rPr>
@@ -5603,7 +6876,7 @@
           <a:p>
             <a:pPr>
               <a:spcBef>
-                <a:spcPts val="300"/>
+                <a:spcPts val="200"/>
               </a:spcBef>
             </a:pPr>
             <a:r>
@@ -5613,7 +6886,7 @@
           <a:p>
             <a:pPr>
               <a:spcBef>
-                <a:spcPts val="300"/>
+                <a:spcPts val="200"/>
               </a:spcBef>
             </a:pPr>
             <a:r>
@@ -5623,7 +6896,7 @@
           <a:p>
             <a:pPr lvl="1">
               <a:spcBef>
-                <a:spcPts val="300"/>
+                <a:spcPts val="200"/>
               </a:spcBef>
             </a:pPr>
             <a:r>
@@ -5642,7 +6915,7 @@
           <a:p>
             <a:pPr>
               <a:spcBef>
-                <a:spcPts val="300"/>
+                <a:spcPts val="200"/>
               </a:spcBef>
             </a:pPr>
             <a:r>
@@ -5661,7 +6934,7 @@
           <a:p>
             <a:pPr lvl="1">
               <a:spcBef>
-                <a:spcPts val="300"/>
+                <a:spcPts val="200"/>
               </a:spcBef>
             </a:pPr>
             <a:r>
@@ -5695,7 +6968,7 @@
           <a:p>
             <a:pPr lvl="1">
               <a:spcBef>
-                <a:spcPts val="300"/>
+                <a:spcPts val="200"/>
               </a:spcBef>
             </a:pPr>
             <a:r>
@@ -5741,7 +7014,7 @@
           <a:p>
             <a:pPr lvl="2">
               <a:spcBef>
-                <a:spcPts val="300"/>
+                <a:spcPts val="200"/>
               </a:spcBef>
             </a:pPr>
             <a:r>
@@ -5763,7 +7036,7 @@
           <a:p>
             <a:pPr lvl="1">
               <a:spcBef>
-                <a:spcPts val="300"/>
+                <a:spcPts val="200"/>
               </a:spcBef>
             </a:pPr>
             <a:r>
@@ -5809,7 +7082,7 @@
           <a:p>
             <a:pPr lvl="2">
               <a:spcBef>
-                <a:spcPts val="300"/>
+                <a:spcPts val="200"/>
               </a:spcBef>
             </a:pPr>
             <a:r>
@@ -5831,17 +7104,17 @@
           <a:p>
             <a:pPr>
               <a:spcBef>
-                <a:spcPts val="300"/>
+                <a:spcPts val="200"/>
               </a:spcBef>
             </a:pPr>
             <a:r>
-              <a:t>The last person on the stack is celebrity</a:t>
+              <a:t>The last person on the stack is celebrity (if does not know any one)</a:t>
             </a:r>
           </a:p>
           <a:p>
             <a:pPr>
               <a:spcBef>
-                <a:spcPts val="300"/>
+                <a:spcPts val="200"/>
               </a:spcBef>
             </a:pPr>
             <a:r>
@@ -5878,7 +7151,7 @@
           <a:p>
             <a:pPr lvl="1" marL="700087" indent="-304800">
               <a:spcBef>
-                <a:spcPts val="300"/>
+                <a:spcPts val="200"/>
               </a:spcBef>
               <a:defRPr sz="3200"/>
             </a:pPr>

</xml_diff>